<commit_message>
Upravy 2.prezentace (pridan 2.slide)
</commit_message>
<xml_diff>
--- a/Prezentace/Prezentace2.pptx
+++ b/Prezentace/Prezentace2.pptx
@@ -6,12 +6,13 @@
   </p:sldMasterIdLst>
   <p:sldIdLst>
     <p:sldId id="256" r:id="rId2"/>
-    <p:sldId id="260" r:id="rId3"/>
-    <p:sldId id="262" r:id="rId4"/>
-    <p:sldId id="264" r:id="rId5"/>
-    <p:sldId id="265" r:id="rId6"/>
-    <p:sldId id="259" r:id="rId7"/>
-    <p:sldId id="263" r:id="rId8"/>
+    <p:sldId id="266" r:id="rId3"/>
+    <p:sldId id="260" r:id="rId4"/>
+    <p:sldId id="262" r:id="rId5"/>
+    <p:sldId id="264" r:id="rId6"/>
+    <p:sldId id="265" r:id="rId7"/>
+    <p:sldId id="259" r:id="rId8"/>
+    <p:sldId id="263" r:id="rId9"/>
   </p:sldIdLst>
   <p:sldSz cx="9144000" cy="6858000" type="screen4x3"/>
   <p:notesSz cx="6858000" cy="9144000"/>
@@ -326,7 +327,7 @@
           <a:p>
             <a:fld id="{D6120B08-1585-444B-86CC-B7045DB4F7A5}" type="datetimeFigureOut">
               <a:rPr lang="cs-CZ" smtClean="0"/>
-              <a:t>07.12.2017</a:t>
+              <a:t>7.12.2017</a:t>
             </a:fld>
             <a:endParaRPr lang="cs-CZ"/>
           </a:p>
@@ -589,7 +590,7 @@
           <a:p>
             <a:fld id="{D6120B08-1585-444B-86CC-B7045DB4F7A5}" type="datetimeFigureOut">
               <a:rPr lang="cs-CZ" smtClean="0"/>
-              <a:t>07.12.2017</a:t>
+              <a:t>7.12.2017</a:t>
             </a:fld>
             <a:endParaRPr lang="cs-CZ"/>
           </a:p>
@@ -762,7 +763,7 @@
           <a:p>
             <a:fld id="{D6120B08-1585-444B-86CC-B7045DB4F7A5}" type="datetimeFigureOut">
               <a:rPr lang="cs-CZ" smtClean="0"/>
-              <a:t>07.12.2017</a:t>
+              <a:t>7.12.2017</a:t>
             </a:fld>
             <a:endParaRPr lang="cs-CZ"/>
           </a:p>
@@ -926,7 +927,7 @@
           <a:p>
             <a:fld id="{D6120B08-1585-444B-86CC-B7045DB4F7A5}" type="datetimeFigureOut">
               <a:rPr lang="cs-CZ" smtClean="0"/>
-              <a:t>07.12.2017</a:t>
+              <a:t>7.12.2017</a:t>
             </a:fld>
             <a:endParaRPr lang="cs-CZ"/>
           </a:p>
@@ -1175,7 +1176,7 @@
           <a:p>
             <a:fld id="{D6120B08-1585-444B-86CC-B7045DB4F7A5}" type="datetimeFigureOut">
               <a:rPr lang="cs-CZ" smtClean="0"/>
-              <a:t>07.12.2017</a:t>
+              <a:t>7.12.2017</a:t>
             </a:fld>
             <a:endParaRPr lang="cs-CZ"/>
           </a:p>
@@ -1457,7 +1458,7 @@
           <a:p>
             <a:fld id="{D6120B08-1585-444B-86CC-B7045DB4F7A5}" type="datetimeFigureOut">
               <a:rPr lang="cs-CZ" smtClean="0"/>
-              <a:t>07.12.2017</a:t>
+              <a:t>7.12.2017</a:t>
             </a:fld>
             <a:endParaRPr lang="cs-CZ"/>
           </a:p>
@@ -1895,7 +1896,7 @@
           <a:p>
             <a:fld id="{D6120B08-1585-444B-86CC-B7045DB4F7A5}" type="datetimeFigureOut">
               <a:rPr lang="cs-CZ" smtClean="0"/>
-              <a:t>07.12.2017</a:t>
+              <a:t>7.12.2017</a:t>
             </a:fld>
             <a:endParaRPr lang="cs-CZ"/>
           </a:p>
@@ -2007,7 +2008,7 @@
           <a:p>
             <a:fld id="{D6120B08-1585-444B-86CC-B7045DB4F7A5}" type="datetimeFigureOut">
               <a:rPr lang="cs-CZ" smtClean="0"/>
-              <a:t>07.12.2017</a:t>
+              <a:t>7.12.2017</a:t>
             </a:fld>
             <a:endParaRPr lang="cs-CZ"/>
           </a:p>
@@ -2097,7 +2098,7 @@
           <a:p>
             <a:fld id="{D6120B08-1585-444B-86CC-B7045DB4F7A5}" type="datetimeFigureOut">
               <a:rPr lang="cs-CZ" smtClean="0"/>
-              <a:t>07.12.2017</a:t>
+              <a:t>7.12.2017</a:t>
             </a:fld>
             <a:endParaRPr lang="cs-CZ"/>
           </a:p>
@@ -2339,7 +2340,7 @@
           <a:p>
             <a:fld id="{D6120B08-1585-444B-86CC-B7045DB4F7A5}" type="datetimeFigureOut">
               <a:rPr lang="cs-CZ" smtClean="0"/>
-              <a:t>07.12.2017</a:t>
+              <a:t>7.12.2017</a:t>
             </a:fld>
             <a:endParaRPr lang="cs-CZ"/>
           </a:p>
@@ -2631,7 +2632,7 @@
           <a:p>
             <a:fld id="{D6120B08-1585-444B-86CC-B7045DB4F7A5}" type="datetimeFigureOut">
               <a:rPr lang="cs-CZ" smtClean="0"/>
-              <a:t>07.12.2017</a:t>
+              <a:t>7.12.2017</a:t>
             </a:fld>
             <a:endParaRPr lang="cs-CZ"/>
           </a:p>
@@ -2925,7 +2926,7 @@
           <a:p>
             <a:fld id="{D6120B08-1585-444B-86CC-B7045DB4F7A5}" type="datetimeFigureOut">
               <a:rPr lang="cs-CZ" smtClean="0"/>
-              <a:t>07.12.2017</a:t>
+              <a:t>7.12.2017</a:t>
             </a:fld>
             <a:endParaRPr lang="cs-CZ"/>
           </a:p>
@@ -3507,6 +3508,146 @@
       </p:grpSpPr>
       <p:sp>
         <p:nvSpPr>
+          <p:cNvPr id="2" name="Nadpis 1">
+            <a:extLst>
+              <a:ext uri="{FF2B5EF4-FFF2-40B4-BE49-F238E27FC236}">
+                <a16:creationId xmlns:a16="http://schemas.microsoft.com/office/drawing/2014/main" id="{9263B420-B24B-4386-9FEA-CDEF093821F4}"/>
+              </a:ext>
+            </a:extLst>
+          </p:cNvPr>
+          <p:cNvSpPr>
+            <a:spLocks noGrp="1"/>
+          </p:cNvSpPr>
+          <p:nvPr>
+            <p:ph type="title"/>
+          </p:nvPr>
+        </p:nvSpPr>
+        <p:spPr/>
+        <p:txBody>
+          <a:bodyPr/>
+          <a:lstStyle/>
+          <a:p>
+            <a:r>
+              <a:rPr lang="cs-CZ" dirty="0"/>
+              <a:t>Rekapitulace</a:t>
+            </a:r>
+          </a:p>
+        </p:txBody>
+      </p:sp>
+      <p:sp>
+        <p:nvSpPr>
+          <p:cNvPr id="3" name="Zástupný symbol pro obsah 2">
+            <a:extLst>
+              <a:ext uri="{FF2B5EF4-FFF2-40B4-BE49-F238E27FC236}">
+                <a16:creationId xmlns:a16="http://schemas.microsoft.com/office/drawing/2014/main" id="{3A27683D-BF6E-46DD-9655-3D5485D260C9}"/>
+              </a:ext>
+            </a:extLst>
+          </p:cNvPr>
+          <p:cNvSpPr>
+            <a:spLocks noGrp="1"/>
+          </p:cNvSpPr>
+          <p:nvPr>
+            <p:ph idx="1"/>
+          </p:nvPr>
+        </p:nvSpPr>
+        <p:spPr/>
+        <p:txBody>
+          <a:bodyPr>
+            <a:normAutofit/>
+          </a:bodyPr>
+          <a:lstStyle/>
+          <a:p>
+            <a:r>
+              <a:rPr lang="cs-CZ" dirty="0"/>
+              <a:t>Zadání číslo 3 – simulace operační systému DOS</a:t>
+            </a:r>
+          </a:p>
+          <a:p>
+            <a:endParaRPr lang="cs-CZ" dirty="0"/>
+          </a:p>
+          <a:p>
+            <a:r>
+              <a:rPr lang="cs-CZ" dirty="0"/>
+              <a:t>Práce byla již téměř hotova</a:t>
+            </a:r>
+          </a:p>
+          <a:p>
+            <a:pPr marL="342900" indent="-342900">
+              <a:buFont typeface="Arial" panose="020B0604020202020204" pitchFamily="34" charset="0"/>
+              <a:buChar char="•"/>
+            </a:pPr>
+            <a:r>
+              <a:rPr lang="cs-CZ" dirty="0"/>
+              <a:t>Optimalizace</a:t>
+            </a:r>
+          </a:p>
+          <a:p>
+            <a:pPr marL="342900" indent="-342900">
+              <a:buFont typeface="Arial" panose="020B0604020202020204" pitchFamily="34" charset="0"/>
+              <a:buChar char="•"/>
+            </a:pPr>
+            <a:r>
+              <a:rPr lang="cs-CZ" dirty="0"/>
+              <a:t>Úpravy dle připomínek</a:t>
+            </a:r>
+          </a:p>
+          <a:p>
+            <a:pPr marL="800100" lvl="1" indent="-342900"/>
+            <a:r>
+              <a:rPr lang="cs-CZ" dirty="0"/>
+              <a:t>Switch-case -&gt; tabulka ukazatelů na funkce</a:t>
+            </a:r>
+          </a:p>
+          <a:p>
+            <a:pPr marL="342900" indent="-342900">
+              <a:buFont typeface="Arial" panose="020B0604020202020204" pitchFamily="34" charset="0"/>
+              <a:buChar char="•"/>
+            </a:pPr>
+            <a:r>
+              <a:rPr lang="cs-CZ" dirty="0"/>
+              <a:t>Komentáře, štábní kultura</a:t>
+            </a:r>
+          </a:p>
+          <a:p>
+            <a:endParaRPr lang="cs-CZ" dirty="0"/>
+          </a:p>
+          <a:p>
+            <a:endParaRPr lang="cs-CZ" dirty="0"/>
+          </a:p>
+        </p:txBody>
+      </p:sp>
+    </p:spTree>
+    <p:extLst>
+      <p:ext uri="{BB962C8B-B14F-4D97-AF65-F5344CB8AC3E}">
+        <p14:creationId xmlns:p14="http://schemas.microsoft.com/office/powerpoint/2010/main" val="1770209062"/>
+      </p:ext>
+    </p:extLst>
+  </p:cSld>
+  <p:clrMapOvr>
+    <a:masterClrMapping/>
+  </p:clrMapOvr>
+</p:sld>
+</file>
+
+<file path=ppt/slides/slide3.xml><?xml version="1.0" encoding="utf-8"?>
+<p:sld xmlns:a="http://schemas.openxmlformats.org/drawingml/2006/main" xmlns:r="http://schemas.openxmlformats.org/officeDocument/2006/relationships" xmlns:p="http://schemas.openxmlformats.org/presentationml/2006/main">
+  <p:cSld>
+    <p:spTree>
+      <p:nvGrpSpPr>
+        <p:cNvPr id="1" name=""/>
+        <p:cNvGrpSpPr/>
+        <p:nvPr/>
+      </p:nvGrpSpPr>
+      <p:grpSpPr>
+        <a:xfrm>
+          <a:off x="0" y="0"/>
+          <a:ext cx="0" cy="0"/>
+          <a:chOff x="0" y="0"/>
+          <a:chExt cx="0" cy="0"/>
+        </a:xfrm>
+      </p:grpSpPr>
+      <p:sp>
+        <p:nvSpPr>
           <p:cNvPr id="2" name="Title 1"/>
           <p:cNvSpPr>
             <a:spLocks noGrp="1"/>
@@ -3726,7 +3867,7 @@
 </p:sld>
 </file>
 
-<file path=ppt/slides/slide3.xml><?xml version="1.0" encoding="utf-8"?>
+<file path=ppt/slides/slide4.xml><?xml version="1.0" encoding="utf-8"?>
 <p:sld xmlns:a="http://schemas.openxmlformats.org/drawingml/2006/main" xmlns:r="http://schemas.openxmlformats.org/officeDocument/2006/relationships" xmlns:p="http://schemas.openxmlformats.org/presentationml/2006/main">
   <p:cSld>
     <p:spTree>
@@ -3841,166 +3982,6 @@
 </p:sld>
 </file>
 
-<file path=ppt/slides/slide4.xml><?xml version="1.0" encoding="utf-8"?>
-<p:sld xmlns:a="http://schemas.openxmlformats.org/drawingml/2006/main" xmlns:r="http://schemas.openxmlformats.org/officeDocument/2006/relationships" xmlns:p="http://schemas.openxmlformats.org/presentationml/2006/main">
-  <p:cSld>
-    <p:spTree>
-      <p:nvGrpSpPr>
-        <p:cNvPr id="1" name=""/>
-        <p:cNvGrpSpPr/>
-        <p:nvPr/>
-      </p:nvGrpSpPr>
-      <p:grpSpPr>
-        <a:xfrm>
-          <a:off x="0" y="0"/>
-          <a:ext cx="0" cy="0"/>
-          <a:chOff x="0" y="0"/>
-          <a:chExt cx="0" cy="0"/>
-        </a:xfrm>
-      </p:grpSpPr>
-      <p:sp>
-        <p:nvSpPr>
-          <p:cNvPr id="2" name="Nadpis 1">
-            <a:extLst>
-              <a:ext uri="{FF2B5EF4-FFF2-40B4-BE49-F238E27FC236}">
-                <a16:creationId xmlns:a16="http://schemas.microsoft.com/office/drawing/2014/main" id="{5A703B58-ECAB-4C64-8B65-F4A1B879D504}"/>
-              </a:ext>
-            </a:extLst>
-          </p:cNvPr>
-          <p:cNvSpPr>
-            <a:spLocks noGrp="1"/>
-          </p:cNvSpPr>
-          <p:nvPr>
-            <p:ph type="title"/>
-          </p:nvPr>
-        </p:nvSpPr>
-        <p:spPr/>
-        <p:txBody>
-          <a:bodyPr/>
-          <a:lstStyle/>
-          <a:p>
-            <a:r>
-              <a:rPr lang="en-US" dirty="0"/>
-              <a:t>Visual studio</a:t>
-            </a:r>
-            <a:endParaRPr lang="cs-CZ" dirty="0"/>
-          </a:p>
-        </p:txBody>
-      </p:sp>
-      <p:sp>
-        <p:nvSpPr>
-          <p:cNvPr id="3" name="Zástupný symbol pro obsah 2">
-            <a:extLst>
-              <a:ext uri="{FF2B5EF4-FFF2-40B4-BE49-F238E27FC236}">
-                <a16:creationId xmlns:a16="http://schemas.microsoft.com/office/drawing/2014/main" id="{40BD4949-958F-49D8-9EE7-494C54B8F0B0}"/>
-              </a:ext>
-            </a:extLst>
-          </p:cNvPr>
-          <p:cNvSpPr>
-            <a:spLocks noGrp="1"/>
-          </p:cNvSpPr>
-          <p:nvPr>
-            <p:ph idx="1"/>
-          </p:nvPr>
-        </p:nvSpPr>
-        <p:spPr/>
-        <p:txBody>
-          <a:bodyPr/>
-          <a:lstStyle/>
-          <a:p>
-            <a:r>
-              <a:rPr lang="en-US" dirty="0" err="1"/>
-              <a:t>CLion</a:t>
-            </a:r>
-            <a:r>
-              <a:rPr lang="en-US" dirty="0"/>
-              <a:t> -&gt; Visual studio</a:t>
-            </a:r>
-          </a:p>
-          <a:p>
-            <a:endParaRPr lang="en-US" dirty="0"/>
-          </a:p>
-          <a:p>
-            <a:r>
-              <a:rPr lang="en-US" dirty="0" err="1">
-                <a:latin typeface="Consolas" panose="020B0609020204030204" pitchFamily="49" charset="0"/>
-              </a:rPr>
-              <a:t>fopen_s</a:t>
-            </a:r>
-            <a:r>
-              <a:rPr lang="en-US" dirty="0">
-                <a:latin typeface="Consolas" panose="020B0609020204030204" pitchFamily="49" charset="0"/>
-              </a:rPr>
-              <a:t>(&amp;</a:t>
-            </a:r>
-            <a:r>
-              <a:rPr lang="en-US" dirty="0" err="1">
-                <a:latin typeface="Consolas" panose="020B0609020204030204" pitchFamily="49" charset="0"/>
-              </a:rPr>
-              <a:t>file_pointer,filename</a:t>
-            </a:r>
-            <a:r>
-              <a:rPr lang="en-US" dirty="0">
-                <a:latin typeface="Consolas" panose="020B0609020204030204" pitchFamily="49" charset="0"/>
-              </a:rPr>
-              <a:t>, "</a:t>
-            </a:r>
-            <a:r>
-              <a:rPr lang="en-US" dirty="0" err="1">
-                <a:latin typeface="Consolas" panose="020B0609020204030204" pitchFamily="49" charset="0"/>
-              </a:rPr>
-              <a:t>rb</a:t>
-            </a:r>
-            <a:r>
-              <a:rPr lang="en-US" dirty="0">
-                <a:latin typeface="Consolas" panose="020B0609020204030204" pitchFamily="49" charset="0"/>
-              </a:rPr>
-              <a:t>");</a:t>
-            </a:r>
-          </a:p>
-          <a:p>
-            <a:endParaRPr lang="en-US" dirty="0">
-              <a:latin typeface="Consolas" panose="020B0609020204030204" pitchFamily="49" charset="0"/>
-            </a:endParaRPr>
-          </a:p>
-          <a:p>
-            <a:r>
-              <a:rPr lang="cs-CZ" dirty="0"/>
-              <a:t>Statická analýza kódu</a:t>
-            </a:r>
-          </a:p>
-          <a:p>
-            <a:endParaRPr lang="cs-CZ" dirty="0"/>
-          </a:p>
-          <a:p>
-            <a:r>
-              <a:rPr lang="cs-CZ" dirty="0"/>
-              <a:t>Úplná optimalizace (\</a:t>
-            </a:r>
-            <a:r>
-              <a:rPr lang="cs-CZ" dirty="0" err="1"/>
-              <a:t>Ox</a:t>
-            </a:r>
-            <a:r>
-              <a:rPr lang="cs-CZ" dirty="0"/>
-              <a:t>)</a:t>
-            </a:r>
-          </a:p>
-        </p:txBody>
-      </p:sp>
-    </p:spTree>
-    <p:extLst>
-      <p:ext uri="{BB962C8B-B14F-4D97-AF65-F5344CB8AC3E}">
-        <p14:creationId xmlns:p14="http://schemas.microsoft.com/office/powerpoint/2010/main" val="1637411722"/>
-      </p:ext>
-    </p:extLst>
-  </p:cSld>
-  <p:clrMapOvr>
-    <a:masterClrMapping/>
-  </p:clrMapOvr>
-</p:sld>
-</file>
-
 <file path=ppt/slides/slide5.xml><?xml version="1.0" encoding="utf-8"?>
 <p:sld xmlns:a="http://schemas.openxmlformats.org/drawingml/2006/main" xmlns:r="http://schemas.openxmlformats.org/officeDocument/2006/relationships" xmlns:p="http://schemas.openxmlformats.org/presentationml/2006/main">
   <p:cSld>
@@ -4023,6 +4004,166 @@
           <p:cNvPr id="2" name="Nadpis 1">
             <a:extLst>
               <a:ext uri="{FF2B5EF4-FFF2-40B4-BE49-F238E27FC236}">
+                <a16:creationId xmlns:a16="http://schemas.microsoft.com/office/drawing/2014/main" id="{5A703B58-ECAB-4C64-8B65-F4A1B879D504}"/>
+              </a:ext>
+            </a:extLst>
+          </p:cNvPr>
+          <p:cNvSpPr>
+            <a:spLocks noGrp="1"/>
+          </p:cNvSpPr>
+          <p:nvPr>
+            <p:ph type="title"/>
+          </p:nvPr>
+        </p:nvSpPr>
+        <p:spPr/>
+        <p:txBody>
+          <a:bodyPr/>
+          <a:lstStyle/>
+          <a:p>
+            <a:r>
+              <a:rPr lang="en-US" dirty="0"/>
+              <a:t>Visual studio</a:t>
+            </a:r>
+            <a:endParaRPr lang="cs-CZ" dirty="0"/>
+          </a:p>
+        </p:txBody>
+      </p:sp>
+      <p:sp>
+        <p:nvSpPr>
+          <p:cNvPr id="3" name="Zástupný symbol pro obsah 2">
+            <a:extLst>
+              <a:ext uri="{FF2B5EF4-FFF2-40B4-BE49-F238E27FC236}">
+                <a16:creationId xmlns:a16="http://schemas.microsoft.com/office/drawing/2014/main" id="{40BD4949-958F-49D8-9EE7-494C54B8F0B0}"/>
+              </a:ext>
+            </a:extLst>
+          </p:cNvPr>
+          <p:cNvSpPr>
+            <a:spLocks noGrp="1"/>
+          </p:cNvSpPr>
+          <p:nvPr>
+            <p:ph idx="1"/>
+          </p:nvPr>
+        </p:nvSpPr>
+        <p:spPr/>
+        <p:txBody>
+          <a:bodyPr/>
+          <a:lstStyle/>
+          <a:p>
+            <a:r>
+              <a:rPr lang="en-US" dirty="0" err="1"/>
+              <a:t>CLion</a:t>
+            </a:r>
+            <a:r>
+              <a:rPr lang="en-US" dirty="0"/>
+              <a:t> -&gt; Visual studio</a:t>
+            </a:r>
+          </a:p>
+          <a:p>
+            <a:endParaRPr lang="en-US" dirty="0"/>
+          </a:p>
+          <a:p>
+            <a:r>
+              <a:rPr lang="en-US" dirty="0" err="1">
+                <a:latin typeface="Consolas" panose="020B0609020204030204" pitchFamily="49" charset="0"/>
+              </a:rPr>
+              <a:t>fopen_s</a:t>
+            </a:r>
+            <a:r>
+              <a:rPr lang="en-US" dirty="0">
+                <a:latin typeface="Consolas" panose="020B0609020204030204" pitchFamily="49" charset="0"/>
+              </a:rPr>
+              <a:t>(&amp;</a:t>
+            </a:r>
+            <a:r>
+              <a:rPr lang="en-US" dirty="0" err="1">
+                <a:latin typeface="Consolas" panose="020B0609020204030204" pitchFamily="49" charset="0"/>
+              </a:rPr>
+              <a:t>file_pointer,filename</a:t>
+            </a:r>
+            <a:r>
+              <a:rPr lang="en-US" dirty="0">
+                <a:latin typeface="Consolas" panose="020B0609020204030204" pitchFamily="49" charset="0"/>
+              </a:rPr>
+              <a:t>, "</a:t>
+            </a:r>
+            <a:r>
+              <a:rPr lang="en-US" dirty="0" err="1">
+                <a:latin typeface="Consolas" panose="020B0609020204030204" pitchFamily="49" charset="0"/>
+              </a:rPr>
+              <a:t>rb</a:t>
+            </a:r>
+            <a:r>
+              <a:rPr lang="en-US" dirty="0">
+                <a:latin typeface="Consolas" panose="020B0609020204030204" pitchFamily="49" charset="0"/>
+              </a:rPr>
+              <a:t>");</a:t>
+            </a:r>
+          </a:p>
+          <a:p>
+            <a:endParaRPr lang="en-US" dirty="0">
+              <a:latin typeface="Consolas" panose="020B0609020204030204" pitchFamily="49" charset="0"/>
+            </a:endParaRPr>
+          </a:p>
+          <a:p>
+            <a:r>
+              <a:rPr lang="cs-CZ" dirty="0"/>
+              <a:t>Statická analýza kódu</a:t>
+            </a:r>
+          </a:p>
+          <a:p>
+            <a:endParaRPr lang="cs-CZ" dirty="0"/>
+          </a:p>
+          <a:p>
+            <a:r>
+              <a:rPr lang="cs-CZ" dirty="0"/>
+              <a:t>Úplná optimalizace (\</a:t>
+            </a:r>
+            <a:r>
+              <a:rPr lang="cs-CZ" dirty="0" err="1"/>
+              <a:t>Ox</a:t>
+            </a:r>
+            <a:r>
+              <a:rPr lang="cs-CZ" dirty="0"/>
+              <a:t>)</a:t>
+            </a:r>
+          </a:p>
+        </p:txBody>
+      </p:sp>
+    </p:spTree>
+    <p:extLst>
+      <p:ext uri="{BB962C8B-B14F-4D97-AF65-F5344CB8AC3E}">
+        <p14:creationId xmlns:p14="http://schemas.microsoft.com/office/powerpoint/2010/main" val="1637411722"/>
+      </p:ext>
+    </p:extLst>
+  </p:cSld>
+  <p:clrMapOvr>
+    <a:masterClrMapping/>
+  </p:clrMapOvr>
+</p:sld>
+</file>
+
+<file path=ppt/slides/slide6.xml><?xml version="1.0" encoding="utf-8"?>
+<p:sld xmlns:a="http://schemas.openxmlformats.org/drawingml/2006/main" xmlns:r="http://schemas.openxmlformats.org/officeDocument/2006/relationships" xmlns:p="http://schemas.openxmlformats.org/presentationml/2006/main">
+  <p:cSld>
+    <p:spTree>
+      <p:nvGrpSpPr>
+        <p:cNvPr id="1" name=""/>
+        <p:cNvGrpSpPr/>
+        <p:nvPr/>
+      </p:nvGrpSpPr>
+      <p:grpSpPr>
+        <a:xfrm>
+          <a:off x="0" y="0"/>
+          <a:ext cx="0" cy="0"/>
+          <a:chOff x="0" y="0"/>
+          <a:chExt cx="0" cy="0"/>
+        </a:xfrm>
+      </p:grpSpPr>
+      <p:sp>
+        <p:nvSpPr>
+          <p:cNvPr id="2" name="Nadpis 1">
+            <a:extLst>
+              <a:ext uri="{FF2B5EF4-FFF2-40B4-BE49-F238E27FC236}">
                 <a16:creationId xmlns:a16="http://schemas.microsoft.com/office/drawing/2014/main" id="{9263B420-B24B-4386-9FEA-CDEF093821F4}"/>
               </a:ext>
             </a:extLst>
@@ -4111,7 +4252,7 @@
 </p:sld>
 </file>
 
-<file path=ppt/slides/slide6.xml><?xml version="1.0" encoding="utf-8"?>
+<file path=ppt/slides/slide7.xml><?xml version="1.0" encoding="utf-8"?>
 <p:sld xmlns:a="http://schemas.openxmlformats.org/drawingml/2006/main" xmlns:r="http://schemas.openxmlformats.org/officeDocument/2006/relationships" xmlns:p="http://schemas.openxmlformats.org/presentationml/2006/main">
   <p:cSld>
     <p:spTree>
@@ -4670,7 +4811,7 @@
 </p:sld>
 </file>
 
-<file path=ppt/slides/slide7.xml><?xml version="1.0" encoding="utf-8"?>
+<file path=ppt/slides/slide8.xml><?xml version="1.0" encoding="utf-8"?>
 <p:sld xmlns:a="http://schemas.openxmlformats.org/drawingml/2006/main" xmlns:r="http://schemas.openxmlformats.org/officeDocument/2006/relationships" xmlns:p="http://schemas.openxmlformats.org/presentationml/2006/main">
   <p:cSld>
     <p:spTree>

</xml_diff>